<commit_message>
I'm doing the review in this branch, apparently
</commit_message>
<xml_diff>
--- a/Introduction to Human Computer Interaction 2015 Part 2.pptx
+++ b/Introduction to Human Computer Interaction 2015 Part 2.pptx
@@ -126,6 +126,22 @@
       </a:defRPr>
     </a:lvl9pPr>
   </p:defaultTextStyle>
+  <p:extLst>
+    <p:ext uri="{EFAFB233-063F-42B5-8137-9DF3F51BA10A}">
+      <p15:sldGuideLst xmlns:p15="http://schemas.microsoft.com/office/powerpoint/2012/main">
+        <p15:guide id="1" orient="horz" pos="2160">
+          <p15:clr>
+            <a:srgbClr val="A4A3A4"/>
+          </p15:clr>
+        </p15:guide>
+        <p15:guide id="2" pos="2880">
+          <p15:clr>
+            <a:srgbClr val="A4A3A4"/>
+          </p15:clr>
+        </p15:guide>
+      </p15:sldGuideLst>
+    </p:ext>
+  </p:extLst>
 </p:presentation>
 </file>
 
@@ -211,7 +227,7 @@
           <a:p>
             <a:fld id="{9A86BC78-63F5-42B5-B37C-94149D4727F5}" type="datetimeFigureOut">
               <a:rPr lang="en-CA" smtClean="0"/>
-              <a:t>13/08/2014</a:t>
+              <a:t>2015-10-24</a:t>
             </a:fld>
             <a:endParaRPr lang="en-CA"/>
           </a:p>
@@ -377,7 +393,7 @@
             <a:fld id="{85755105-574B-4732-8ED2-5E42F785DB1B}" type="datetimeFigureOut">
               <a:rPr lang="en-US" smtClean="0"/>
               <a:pPr/>
-              <a:t>8/13/2014</a:t>
+              <a:t>10/24/2015</a:t>
             </a:fld>
             <a:endParaRPr lang="en-CA"/>
           </a:p>
@@ -723,6 +739,11 @@
         </p:txBody>
       </p:sp>
     </p:spTree>
+    <p:extLst>
+      <p:ext uri="{BB962C8B-B14F-4D97-AF65-F5344CB8AC3E}">
+        <p14:creationId xmlns:p14="http://schemas.microsoft.com/office/powerpoint/2010/main" val="4075333599"/>
+      </p:ext>
+    </p:extLst>
   </p:cSld>
   <p:clrMapOvr>
     <a:masterClrMapping/>
@@ -1105,7 +1126,7 @@
             <a:fld id="{8DB28D32-A5AC-49CB-A312-8CBF8BC93DDE}" type="datetimeFigureOut">
               <a:rPr lang="en-US" smtClean="0"/>
               <a:pPr/>
-              <a:t>8/13/2014</a:t>
+              <a:t>10/24/2015</a:t>
             </a:fld>
             <a:endParaRPr lang="en-CA"/>
           </a:p>
@@ -1272,7 +1293,7 @@
             <a:fld id="{8DB28D32-A5AC-49CB-A312-8CBF8BC93DDE}" type="datetimeFigureOut">
               <a:rPr lang="en-US" smtClean="0"/>
               <a:pPr/>
-              <a:t>8/13/2014</a:t>
+              <a:t>10/24/2015</a:t>
             </a:fld>
             <a:endParaRPr lang="en-CA"/>
           </a:p>
@@ -1449,7 +1470,7 @@
             <a:fld id="{8DB28D32-A5AC-49CB-A312-8CBF8BC93DDE}" type="datetimeFigureOut">
               <a:rPr lang="en-US" smtClean="0"/>
               <a:pPr/>
-              <a:t>8/13/2014</a:t>
+              <a:t>10/24/2015</a:t>
             </a:fld>
             <a:endParaRPr lang="en-CA"/>
           </a:p>
@@ -1616,7 +1637,7 @@
             <a:fld id="{8DB28D32-A5AC-49CB-A312-8CBF8BC93DDE}" type="datetimeFigureOut">
               <a:rPr lang="en-US" smtClean="0"/>
               <a:pPr/>
-              <a:t>8/13/2014</a:t>
+              <a:t>10/24/2015</a:t>
             </a:fld>
             <a:endParaRPr lang="en-CA"/>
           </a:p>
@@ -1859,7 +1880,7 @@
             <a:fld id="{8DB28D32-A5AC-49CB-A312-8CBF8BC93DDE}" type="datetimeFigureOut">
               <a:rPr lang="en-US" smtClean="0"/>
               <a:pPr/>
-              <a:t>8/13/2014</a:t>
+              <a:t>10/24/2015</a:t>
             </a:fld>
             <a:endParaRPr lang="en-CA"/>
           </a:p>
@@ -2144,7 +2165,7 @@
             <a:fld id="{8DB28D32-A5AC-49CB-A312-8CBF8BC93DDE}" type="datetimeFigureOut">
               <a:rPr lang="en-US" smtClean="0"/>
               <a:pPr/>
-              <a:t>8/13/2014</a:t>
+              <a:t>10/24/2015</a:t>
             </a:fld>
             <a:endParaRPr lang="en-CA"/>
           </a:p>
@@ -2563,7 +2584,7 @@
             <a:fld id="{8DB28D32-A5AC-49CB-A312-8CBF8BC93DDE}" type="datetimeFigureOut">
               <a:rPr lang="en-US" smtClean="0"/>
               <a:pPr/>
-              <a:t>8/13/2014</a:t>
+              <a:t>10/24/2015</a:t>
             </a:fld>
             <a:endParaRPr lang="en-CA"/>
           </a:p>
@@ -2678,7 +2699,7 @@
             <a:fld id="{8DB28D32-A5AC-49CB-A312-8CBF8BC93DDE}" type="datetimeFigureOut">
               <a:rPr lang="en-US" smtClean="0"/>
               <a:pPr/>
-              <a:t>8/13/2014</a:t>
+              <a:t>10/24/2015</a:t>
             </a:fld>
             <a:endParaRPr lang="en-CA"/>
           </a:p>
@@ -2770,7 +2791,7 @@
             <a:fld id="{8DB28D32-A5AC-49CB-A312-8CBF8BC93DDE}" type="datetimeFigureOut">
               <a:rPr lang="en-US" smtClean="0"/>
               <a:pPr/>
-              <a:t>8/13/2014</a:t>
+              <a:t>10/24/2015</a:t>
             </a:fld>
             <a:endParaRPr lang="en-CA"/>
           </a:p>
@@ -3044,7 +3065,7 @@
             <a:fld id="{8DB28D32-A5AC-49CB-A312-8CBF8BC93DDE}" type="datetimeFigureOut">
               <a:rPr lang="en-US" smtClean="0"/>
               <a:pPr/>
-              <a:t>8/13/2014</a:t>
+              <a:t>10/24/2015</a:t>
             </a:fld>
             <a:endParaRPr lang="en-CA"/>
           </a:p>
@@ -3294,7 +3315,7 @@
             <a:fld id="{8DB28D32-A5AC-49CB-A312-8CBF8BC93DDE}" type="datetimeFigureOut">
               <a:rPr lang="en-US" smtClean="0"/>
               <a:pPr/>
-              <a:t>8/13/2014</a:t>
+              <a:t>10/24/2015</a:t>
             </a:fld>
             <a:endParaRPr lang="en-CA"/>
           </a:p>
@@ -3504,7 +3525,7 @@
             <a:fld id="{8DB28D32-A5AC-49CB-A312-8CBF8BC93DDE}" type="datetimeFigureOut">
               <a:rPr lang="en-US" smtClean="0"/>
               <a:pPr/>
-              <a:t>8/13/2014</a:t>
+              <a:t>10/24/2015</a:t>
             </a:fld>
             <a:endParaRPr lang="en-CA"/>
           </a:p>
@@ -4137,8 +4158,27 @@
               </a:lnSpc>
             </a:pPr>
             <a:r>
+              <a:rPr lang="en-US" sz="2000" dirty="0" smtClean="0"/>
+              <a:t>Posterior </a:t>
+            </a:r>
+            <a:r>
               <a:rPr lang="en-US" sz="2000" dirty="0"/>
-              <a:t>Prior probability of a bag: P(H1) = P(H2) = 0.5</a:t>
+              <a:t>probability of a Kit-Kat candy conditioned on bag H1</a:t>
+            </a:r>
+          </a:p>
+          <a:p>
+            <a:pPr lvl="2">
+              <a:lnSpc>
+                <a:spcPct val="80000"/>
+              </a:lnSpc>
+            </a:pPr>
+            <a:r>
+              <a:rPr lang="en-US" sz="2000" dirty="0" smtClean="0"/>
+              <a:t>P(X|H1) </a:t>
+            </a:r>
+            <a:r>
+              <a:rPr lang="en-US" sz="2000" dirty="0"/>
+              <a:t>= 6/12 = 1/2 = 0.5</a:t>
             </a:r>
           </a:p>
           <a:p>
@@ -4149,7 +4189,7 @@
             </a:pPr>
             <a:r>
               <a:rPr lang="en-US" sz="2000" dirty="0"/>
-              <a:t>Posterior probability of a Kit-Kat candy conditioned on bag H1</a:t>
+              <a:t>Posterior probability of a Kit-Kat candy conditioned on bag H2</a:t>
             </a:r>
           </a:p>
           <a:p>
@@ -4159,12 +4199,12 @@
               </a:lnSpc>
             </a:pPr>
             <a:r>
+              <a:rPr lang="en-US" sz="2000" dirty="0"/>
+              <a:t>P(X|H2) = 3/12 = ¼ = </a:t>
+            </a:r>
+            <a:r>
               <a:rPr lang="en-US" sz="2000" dirty="0" smtClean="0"/>
-              <a:t>P(X|H1) </a:t>
-            </a:r>
-            <a:r>
-              <a:rPr lang="en-US" sz="2000" dirty="0"/>
-              <a:t>= 6/12 = 1/2 = 0.5</a:t>
+              <a:t>0.25</a:t>
             </a:r>
           </a:p>
           <a:p>
@@ -4175,19 +4215,33 @@
             </a:pPr>
             <a:r>
               <a:rPr lang="en-US" sz="2000" dirty="0"/>
-              <a:t>Posterior probability of a Kit-Kat candy conditioned on bag H2</a:t>
-            </a:r>
-          </a:p>
-          <a:p>
-            <a:pPr lvl="2">
-              <a:lnSpc>
-                <a:spcPct val="80000"/>
-              </a:lnSpc>
-            </a:pPr>
+              <a:t>Prior probability of a bag: P(</a:t>
+            </a:r>
+            <a:r>
+              <a:rPr lang="en-US" sz="2000" dirty="0" err="1"/>
+              <a:t>H1</a:t>
+            </a:r>
             <a:r>
               <a:rPr lang="en-US" sz="2000" dirty="0"/>
-              <a:t>P(X|H2) = 3/12 = ¼ = 0.25</a:t>
-            </a:r>
+              <a:t>) = P(</a:t>
+            </a:r>
+            <a:r>
+              <a:rPr lang="en-US" sz="2000" dirty="0" err="1"/>
+              <a:t>H2</a:t>
+            </a:r>
+            <a:r>
+              <a:rPr lang="en-US" sz="2000" dirty="0"/>
+              <a:t>) </a:t>
+            </a:r>
+            <a:r>
+              <a:rPr lang="en-US" sz="2000"/>
+              <a:t>= </a:t>
+            </a:r>
+            <a:r>
+              <a:rPr lang="en-US" sz="2000" smtClean="0"/>
+              <a:t>0.5</a:t>
+            </a:r>
+            <a:endParaRPr lang="en-US" sz="2000" dirty="0" smtClean="0"/>
           </a:p>
           <a:p>
             <a:pPr lvl="1">
@@ -4196,8 +4250,12 @@
               </a:lnSpc>
             </a:pPr>
             <a:r>
+              <a:rPr lang="en-US" sz="2000" dirty="0" smtClean="0"/>
+              <a:t>Prior </a:t>
+            </a:r>
+            <a:r>
               <a:rPr lang="en-US" sz="2000" dirty="0"/>
-              <a:t>Prior probability of a Kit-Kat candy from any bag: P(X) = P(H1)*P(X|H1)  + P(H2)*P(X|H2) =  0.5*0.5 + 0.5*0.25 = 0.25 + 0.125 = 0.375</a:t>
+              <a:t>probability of a Kit-Kat candy from any bag: P(X) = P(H1)*P(X|H1)  + P(H2)*P(X|H2) =  0.5*0.5 + 0.5*0.25 = 0.25 + 0.125 = 0.375</a:t>
             </a:r>
           </a:p>
           <a:p>
@@ -4497,33 +4555,15 @@
                                   </p:childTnLst>
                                 </p:cTn>
                               </p:par>
-                            </p:childTnLst>
-                          </p:cTn>
-                        </p:par>
-                      </p:childTnLst>
-                    </p:cTn>
-                  </p:par>
-                  <p:par>
-                    <p:cTn id="23" fill="hold">
-                      <p:stCondLst>
-                        <p:cond delay="indefinite"/>
-                      </p:stCondLst>
-                      <p:childTnLst>
-                        <p:par>
-                          <p:cTn id="24" fill="hold">
-                            <p:stCondLst>
-                              <p:cond delay="0"/>
-                            </p:stCondLst>
-                            <p:childTnLst>
                               <p:par>
-                                <p:cTn id="25" presetID="1" presetClass="entr" presetSubtype="0" fill="hold" nodeType="clickEffect">
+                                <p:cTn id="23" presetID="1" presetClass="entr" presetSubtype="0" fill="hold" nodeType="withEffect">
                                   <p:stCondLst>
                                     <p:cond delay="0"/>
                                   </p:stCondLst>
                                   <p:childTnLst>
                                     <p:set>
                                       <p:cBhvr>
-                                        <p:cTn id="26" dur="1" fill="hold">
+                                        <p:cTn id="24" dur="1" fill="hold">
                                           <p:stCondLst>
                                             <p:cond delay="0"/>
                                           </p:stCondLst>
@@ -4546,8 +4586,26 @@
                                   </p:childTnLst>
                                 </p:cTn>
                               </p:par>
+                            </p:childTnLst>
+                          </p:cTn>
+                        </p:par>
+                      </p:childTnLst>
+                    </p:cTn>
+                  </p:par>
+                  <p:par>
+                    <p:cTn id="25" fill="hold">
+                      <p:stCondLst>
+                        <p:cond delay="indefinite"/>
+                      </p:stCondLst>
+                      <p:childTnLst>
+                        <p:par>
+                          <p:cTn id="26" fill="hold">
+                            <p:stCondLst>
+                              <p:cond delay="0"/>
+                            </p:stCondLst>
+                            <p:childTnLst>
                               <p:par>
-                                <p:cTn id="27" presetID="1" presetClass="entr" presetSubtype="0" fill="hold" nodeType="withEffect">
+                                <p:cTn id="27" presetID="1" presetClass="entr" presetSubtype="0" fill="hold" nodeType="clickEffect">
                                   <p:stCondLst>
                                     <p:cond delay="0"/>
                                   </p:stCondLst>
@@ -4577,33 +4635,15 @@
                                   </p:childTnLst>
                                 </p:cTn>
                               </p:par>
-                            </p:childTnLst>
-                          </p:cTn>
-                        </p:par>
-                      </p:childTnLst>
-                    </p:cTn>
-                  </p:par>
-                  <p:par>
-                    <p:cTn id="29" fill="hold">
-                      <p:stCondLst>
-                        <p:cond delay="indefinite"/>
-                      </p:stCondLst>
-                      <p:childTnLst>
-                        <p:par>
-                          <p:cTn id="30" fill="hold">
-                            <p:stCondLst>
-                              <p:cond delay="0"/>
-                            </p:stCondLst>
-                            <p:childTnLst>
                               <p:par>
-                                <p:cTn id="31" presetID="1" presetClass="entr" presetSubtype="0" fill="hold" nodeType="clickEffect">
+                                <p:cTn id="29" presetID="1" presetClass="entr" presetSubtype="0" fill="hold" nodeType="withEffect">
                                   <p:stCondLst>
                                     <p:cond delay="0"/>
                                   </p:stCondLst>
                                   <p:childTnLst>
                                     <p:set>
                                       <p:cBhvr>
-                                        <p:cTn id="32" dur="1" fill="hold">
+                                        <p:cTn id="30" dur="1" fill="hold">
                                           <p:stCondLst>
                                             <p:cond delay="0"/>
                                           </p:stCondLst>
@@ -4627,14 +4667,14 @@
                                 </p:cTn>
                               </p:par>
                               <p:par>
-                                <p:cTn id="33" presetID="1" presetClass="entr" presetSubtype="0" fill="hold" nodeType="withEffect">
+                                <p:cTn id="31" presetID="1" presetClass="entr" presetSubtype="0" fill="hold" nodeType="withEffect">
                                   <p:stCondLst>
                                     <p:cond delay="0"/>
                                   </p:stCondLst>
                                   <p:childTnLst>
                                     <p:set>
                                       <p:cBhvr>
-                                        <p:cTn id="34" dur="1" fill="hold">
+                                        <p:cTn id="32" dur="1" fill="hold">
                                           <p:stCondLst>
                                             <p:cond delay="0"/>
                                           </p:stCondLst>
@@ -4664,26 +4704,26 @@
                     </p:cTn>
                   </p:par>
                   <p:par>
-                    <p:cTn id="35" fill="hold">
+                    <p:cTn id="33" fill="hold">
                       <p:stCondLst>
                         <p:cond delay="indefinite"/>
                       </p:stCondLst>
                       <p:childTnLst>
                         <p:par>
-                          <p:cTn id="36" fill="hold">
+                          <p:cTn id="34" fill="hold">
                             <p:stCondLst>
                               <p:cond delay="0"/>
                             </p:stCondLst>
                             <p:childTnLst>
                               <p:par>
-                                <p:cTn id="37" presetID="1" presetClass="entr" presetSubtype="0" fill="hold" nodeType="clickEffect">
+                                <p:cTn id="35" presetID="1" presetClass="entr" presetSubtype="0" fill="hold" nodeType="clickEffect">
                                   <p:stCondLst>
                                     <p:cond delay="0"/>
                                   </p:stCondLst>
                                   <p:childTnLst>
                                     <p:set>
                                       <p:cBhvr>
-                                        <p:cTn id="38" dur="1" fill="hold">
+                                        <p:cTn id="36" dur="1" fill="hold">
                                           <p:stCondLst>
                                             <p:cond delay="0"/>
                                           </p:stCondLst>
@@ -4713,26 +4753,26 @@
                     </p:cTn>
                   </p:par>
                   <p:par>
-                    <p:cTn id="39" fill="hold">
+                    <p:cTn id="37" fill="hold">
                       <p:stCondLst>
                         <p:cond delay="indefinite"/>
                       </p:stCondLst>
                       <p:childTnLst>
                         <p:par>
-                          <p:cTn id="40" fill="hold">
+                          <p:cTn id="38" fill="hold">
                             <p:stCondLst>
                               <p:cond delay="0"/>
                             </p:stCondLst>
                             <p:childTnLst>
                               <p:par>
-                                <p:cTn id="41" presetID="1" presetClass="entr" presetSubtype="0" fill="hold" nodeType="clickEffect">
+                                <p:cTn id="39" presetID="1" presetClass="entr" presetSubtype="0" fill="hold" nodeType="clickEffect">
                                   <p:stCondLst>
                                     <p:cond delay="0"/>
                                   </p:stCondLst>
                                   <p:childTnLst>
                                     <p:set>
                                       <p:cBhvr>
-                                        <p:cTn id="42" dur="1" fill="hold">
+                                        <p:cTn id="40" dur="1" fill="hold">
                                           <p:stCondLst>
                                             <p:cond delay="0"/>
                                           </p:stCondLst>

</xml_diff>